<commit_message>
Edited challenges section and added references
</commit_message>
<xml_diff>
--- a/Abdul_Final_draft.pptx
+++ b/Abdul_Final_draft.pptx
@@ -4305,88 +4305,98 @@
           <a:bodyPr lIns="586140" tIns="586140" rIns="586140" bIns="586140"/>
           <a:lstStyle/>
           <a:p>
+            <a:pPr marL="457200" indent="-457200">
+              <a:buFont typeface="Arial" charset="0"/>
+              <a:buChar char="•"/>
+            </a:pPr>
             <a:r>
               <a:rPr lang="en-US" sz="3000" dirty="0" smtClean="0">
                 <a:latin typeface="Helvetica" charset="0"/>
                 <a:ea typeface="Helvetica" charset="0"/>
                 <a:cs typeface="Helvetica" charset="0"/>
               </a:rPr>
-              <a:t>• Managing </a:t>
-            </a:r>
-            <a:r>
-              <a:rPr lang="en-US" sz="3000" dirty="0">
-                <a:latin typeface="Helvetica" charset="0"/>
-                <a:ea typeface="Helvetica" charset="0"/>
-                <a:cs typeface="Helvetica" charset="0"/>
-              </a:rPr>
-              <a:t>accessibility of </a:t>
-            </a:r>
+              <a:t>Much of the challenge of engineering a C compiler stems from the following sources:</a:t>
+            </a:r>
+          </a:p>
+          <a:p>
+            <a:pPr marL="840471" lvl="1" indent="-457200">
+              <a:buFont typeface="Arial" charset="0"/>
+              <a:buChar char="•"/>
+            </a:pPr>
             <a:r>
               <a:rPr lang="en-US" sz="3000" dirty="0" smtClean="0">
                 <a:latin typeface="Helvetica" charset="0"/>
                 <a:ea typeface="Helvetica" charset="0"/>
                 <a:cs typeface="Helvetica" charset="0"/>
               </a:rPr>
-              <a:t>non-static </a:t>
-            </a:r>
-            <a:r>
-              <a:rPr lang="en-US" sz="3000" dirty="0">
-                <a:latin typeface="Helvetica" charset="0"/>
-                <a:ea typeface="Helvetica" charset="0"/>
-                <a:cs typeface="Helvetica" charset="0"/>
-              </a:rPr>
-              <a:t>global </a:t>
-            </a:r>
-          </a:p>
-          <a:p>
-            <a:r>
-              <a:rPr lang="en-US" sz="3000" dirty="0">
-                <a:latin typeface="Helvetica" charset="0"/>
-                <a:ea typeface="Helvetica" charset="0"/>
-                <a:cs typeface="Helvetica" charset="0"/>
-              </a:rPr>
-              <a:t>variables </a:t>
-            </a:r>
-          </a:p>
-          <a:p>
+              <a:t>Ensuring as much compatibility as possible between extensions—i.e., dialects—of C</a:t>
+            </a:r>
+            <a:endParaRPr lang="en-US" sz="3000" dirty="0">
+              <a:latin typeface="Helvetica" charset="0"/>
+              <a:ea typeface="Helvetica" charset="0"/>
+              <a:cs typeface="Helvetica" charset="0"/>
+            </a:endParaRPr>
+          </a:p>
+          <a:p>
+            <a:pPr marL="840471" lvl="1" indent="-457200">
+              <a:buFont typeface="Arial" charset="0"/>
+              <a:buChar char="•"/>
+            </a:pPr>
             <a:r>
               <a:rPr lang="en-US" sz="3000" dirty="0" smtClean="0">
                 <a:latin typeface="Helvetica" charset="0"/>
                 <a:ea typeface="Helvetica" charset="0"/>
                 <a:cs typeface="Helvetica" charset="0"/>
               </a:rPr>
-              <a:t>• Implementing </a:t>
-            </a:r>
-            <a:r>
-              <a:rPr lang="en-US" sz="3000" dirty="0">
-                <a:latin typeface="Helvetica" charset="0"/>
-                <a:ea typeface="Helvetica" charset="0"/>
-                <a:cs typeface="Helvetica" charset="0"/>
-              </a:rPr>
-              <a:t>pointers, pointer casts, pointer </a:t>
-            </a:r>
+              <a:t>Making a smart tradeoff between efficient compilation and protecting the programmer from the freedom C affords them.</a:t>
+            </a:r>
+            <a:endParaRPr lang="en-US" sz="3000" dirty="0" smtClean="0">
+              <a:latin typeface="Helvetica" charset="0"/>
+              <a:ea typeface="Helvetica" charset="0"/>
+              <a:cs typeface="Helvetica" charset="0"/>
+            </a:endParaRPr>
+          </a:p>
+          <a:p>
+            <a:pPr marL="457200" indent="-457200">
+              <a:buFont typeface="Arial" charset="0"/>
+              <a:buChar char="•"/>
+            </a:pPr>
             <a:r>
               <a:rPr lang="en-US" sz="3000" dirty="0" smtClean="0">
                 <a:latin typeface="Helvetica" charset="0"/>
                 <a:ea typeface="Helvetica" charset="0"/>
                 <a:cs typeface="Helvetica" charset="0"/>
               </a:rPr>
-              <a:t> </a:t>
-            </a:r>
+              <a:t>In response, source code analysis tools such as Lint have been developed to:</a:t>
+            </a:r>
+          </a:p>
+          <a:p>
+            <a:pPr marL="840471" lvl="1" indent="-457200">
+              <a:buFont typeface="Arial" charset="0"/>
+              <a:buChar char="•"/>
+            </a:pPr>
             <a:r>
               <a:rPr lang="en-US" sz="3000" dirty="0" smtClean="0">
                 <a:latin typeface="Helvetica" charset="0"/>
                 <a:ea typeface="Helvetica" charset="0"/>
                 <a:cs typeface="Helvetica" charset="0"/>
               </a:rPr>
-              <a:t>arithmetic</a:t>
-            </a:r>
-          </a:p>
-          <a:p>
-            <a:pPr marL="457200" indent="-457200">
+              <a:t>Check for syntactically valid, but likely erroneous statements—e.g., truncating casts</a:t>
+            </a:r>
+          </a:p>
+          <a:p>
+            <a:pPr marL="840471" lvl="1" indent="-457200">
               <a:buFont typeface="Arial" charset="0"/>
               <a:buChar char="•"/>
             </a:pPr>
+            <a:r>
+              <a:rPr lang="en-US" sz="3000" dirty="0" smtClean="0">
+                <a:latin typeface="Helvetica" charset="0"/>
+                <a:ea typeface="Helvetica" charset="0"/>
+                <a:cs typeface="Helvetica" charset="0"/>
+              </a:rPr>
+              <a:t>Check for compatibility with libraries</a:t>
+            </a:r>
             <a:endParaRPr lang="en-US" sz="3000" dirty="0">
               <a:latin typeface="Helvetica" charset="0"/>
               <a:ea typeface="Helvetica" charset="0"/>
@@ -4878,45 +4888,6 @@
               </a:spcBef>
             </a:pPr>
             <a:endParaRPr lang="en-US" sz="3000" b="1" baseline="30000"/>
-          </a:p>
-        </p:txBody>
-      </p:sp>
-      <p:sp>
-        <p:nvSpPr>
-          <p:cNvPr id="2065" name="Text Box 151"/>
-          <p:cNvSpPr txBox="1">
-            <a:spLocks noChangeArrowheads="1"/>
-          </p:cNvSpPr>
-          <p:nvPr/>
-        </p:nvSpPr>
-        <p:spPr bwMode="auto">
-          <a:xfrm>
-            <a:off x="14266333" y="27839150"/>
-            <a:ext cx="5545667" cy="427979"/>
-          </a:xfrm>
-          <a:prstGeom prst="rect">
-            <a:avLst/>
-          </a:prstGeom>
-          <a:noFill/>
-          <a:ln w="9525">
-            <a:noFill/>
-            <a:miter lim="800000"/>
-            <a:headEnd/>
-            <a:tailEnd/>
-          </a:ln>
-        </p:spPr>
-        <p:txBody>
-          <a:bodyPr lIns="73319" tIns="36660" rIns="73319" bIns="36660">
-            <a:spAutoFit/>
-          </a:bodyPr>
-          <a:lstStyle/>
-          <a:p>
-            <a:pPr algn="just" defTabSz="733272">
-              <a:spcBef>
-                <a:spcPct val="50000"/>
-              </a:spcBef>
-            </a:pPr>
-            <a:endParaRPr lang="en-US" sz="2300"/>
           </a:p>
         </p:txBody>
       </p:sp>
@@ -8479,14 +8450,9 @@
               <a:t>https://</a:t>
             </a:r>
             <a:r>
-              <a:rPr lang="en-US" sz="1800" dirty="0" err="1"/>
-              <a:t>www.codingunit.com</a:t>
-            </a:r>
-            <a:r>
-              <a:rPr lang="en-US" sz="1800" dirty="0"/>
-              <a:t>/the-history-of-the-c-language</a:t>
-            </a:r>
-            <a:endParaRPr lang="en-US" sz="1800" dirty="0" smtClean="0"/>
+              <a:rPr lang="en-US" sz="1800" dirty="0" smtClean="0"/>
+              <a:t>www.codingunit.com/the-history-of-the-c-language</a:t>
+            </a:r>
           </a:p>
           <a:p>
             <a:pPr marL="457200" indent="-457200">
@@ -8494,8 +8460,16 @@
               <a:buChar char="•"/>
             </a:pPr>
             <a:r>
+              <a:rPr lang="en-US" sz="1800" dirty="0"/>
+              <a:t>Lint man page, http://</a:t>
+            </a:r>
+            <a:r>
               <a:rPr lang="en-US" sz="1800" dirty="0" smtClean="0"/>
-              <a:t>XXXX</a:t>
+              <a:t>www.unix.com</a:t>
+            </a:r>
+            <a:r>
+              <a:rPr lang="en-US" sz="1800" smtClean="0"/>
+              <a:t>/man-page/FreeBSD/1/lint</a:t>
             </a:r>
           </a:p>
           <a:p>
@@ -8503,11 +8477,7 @@
               <a:buFont typeface="Arial" charset="0"/>
               <a:buChar char="•"/>
             </a:pPr>
-            <a:r>
-              <a:rPr lang="en-US" sz="1800" dirty="0" smtClean="0"/>
-              <a:t>XXXX</a:t>
-            </a:r>
-            <a:endParaRPr lang="en-US" sz="1800" dirty="0"/>
+            <a:endParaRPr lang="en-US" sz="1800" dirty="0" smtClean="0"/>
           </a:p>
         </p:txBody>
       </p:sp>

</xml_diff>